<commit_message>
laget bilder til overleaf og presentasjon for servi
</commit_message>
<xml_diff>
--- a/Hydraulic drawing/redcrane_anotator.pptx
+++ b/Hydraulic drawing/redcrane_anotator.pptx
@@ -217,7 +217,7 @@
           <a:p>
             <a:fld id="{6674AB72-428D-4829-85BA-134047D80F56}" type="datetimeFigureOut">
               <a:rPr lang="en-GB" smtClean="0"/>
-              <a:t>17/02/2025</a:t>
+              <a:t>14/03/2025</a:t>
             </a:fld>
             <a:endParaRPr lang="en-GB"/>
           </a:p>
@@ -1018,7 +1018,7 @@
           <a:p>
             <a:fld id="{DCCC9C05-9639-4EC7-951E-4D67C5F3A0E0}" type="datetimeFigureOut">
               <a:rPr lang="en-GB" smtClean="0"/>
-              <a:t>17/02/2025</a:t>
+              <a:t>14/03/2025</a:t>
             </a:fld>
             <a:endParaRPr lang="en-GB"/>
           </a:p>
@@ -1218,7 +1218,7 @@
           <a:p>
             <a:fld id="{DCCC9C05-9639-4EC7-951E-4D67C5F3A0E0}" type="datetimeFigureOut">
               <a:rPr lang="en-GB" smtClean="0"/>
-              <a:t>17/02/2025</a:t>
+              <a:t>14/03/2025</a:t>
             </a:fld>
             <a:endParaRPr lang="en-GB"/>
           </a:p>
@@ -1428,7 +1428,7 @@
           <a:p>
             <a:fld id="{DCCC9C05-9639-4EC7-951E-4D67C5F3A0E0}" type="datetimeFigureOut">
               <a:rPr lang="en-GB" smtClean="0"/>
-              <a:t>17/02/2025</a:t>
+              <a:t>14/03/2025</a:t>
             </a:fld>
             <a:endParaRPr lang="en-GB"/>
           </a:p>
@@ -1628,7 +1628,7 @@
           <a:p>
             <a:fld id="{DCCC9C05-9639-4EC7-951E-4D67C5F3A0E0}" type="datetimeFigureOut">
               <a:rPr lang="en-GB" smtClean="0"/>
-              <a:t>17/02/2025</a:t>
+              <a:t>14/03/2025</a:t>
             </a:fld>
             <a:endParaRPr lang="en-GB"/>
           </a:p>
@@ -1904,7 +1904,7 @@
           <a:p>
             <a:fld id="{DCCC9C05-9639-4EC7-951E-4D67C5F3A0E0}" type="datetimeFigureOut">
               <a:rPr lang="en-GB" smtClean="0"/>
-              <a:t>17/02/2025</a:t>
+              <a:t>14/03/2025</a:t>
             </a:fld>
             <a:endParaRPr lang="en-GB"/>
           </a:p>
@@ -2172,7 +2172,7 @@
           <a:p>
             <a:fld id="{DCCC9C05-9639-4EC7-951E-4D67C5F3A0E0}" type="datetimeFigureOut">
               <a:rPr lang="en-GB" smtClean="0"/>
-              <a:t>17/02/2025</a:t>
+              <a:t>14/03/2025</a:t>
             </a:fld>
             <a:endParaRPr lang="en-GB"/>
           </a:p>
@@ -2587,7 +2587,7 @@
           <a:p>
             <a:fld id="{DCCC9C05-9639-4EC7-951E-4D67C5F3A0E0}" type="datetimeFigureOut">
               <a:rPr lang="en-GB" smtClean="0"/>
-              <a:t>17/02/2025</a:t>
+              <a:t>14/03/2025</a:t>
             </a:fld>
             <a:endParaRPr lang="en-GB"/>
           </a:p>
@@ -2729,7 +2729,7 @@
           <a:p>
             <a:fld id="{DCCC9C05-9639-4EC7-951E-4D67C5F3A0E0}" type="datetimeFigureOut">
               <a:rPr lang="en-GB" smtClean="0"/>
-              <a:t>17/02/2025</a:t>
+              <a:t>14/03/2025</a:t>
             </a:fld>
             <a:endParaRPr lang="en-GB"/>
           </a:p>
@@ -2842,7 +2842,7 @@
           <a:p>
             <a:fld id="{DCCC9C05-9639-4EC7-951E-4D67C5F3A0E0}" type="datetimeFigureOut">
               <a:rPr lang="en-GB" smtClean="0"/>
-              <a:t>17/02/2025</a:t>
+              <a:t>14/03/2025</a:t>
             </a:fld>
             <a:endParaRPr lang="en-GB"/>
           </a:p>
@@ -3155,7 +3155,7 @@
           <a:p>
             <a:fld id="{DCCC9C05-9639-4EC7-951E-4D67C5F3A0E0}" type="datetimeFigureOut">
               <a:rPr lang="en-GB" smtClean="0"/>
-              <a:t>17/02/2025</a:t>
+              <a:t>14/03/2025</a:t>
             </a:fld>
             <a:endParaRPr lang="en-GB"/>
           </a:p>
@@ -3444,7 +3444,7 @@
           <a:p>
             <a:fld id="{DCCC9C05-9639-4EC7-951E-4D67C5F3A0E0}" type="datetimeFigureOut">
               <a:rPr lang="en-GB" smtClean="0"/>
-              <a:t>17/02/2025</a:t>
+              <a:t>14/03/2025</a:t>
             </a:fld>
             <a:endParaRPr lang="en-GB"/>
           </a:p>
@@ -3687,7 +3687,7 @@
           <a:p>
             <a:fld id="{DCCC9C05-9639-4EC7-951E-4D67C5F3A0E0}" type="datetimeFigureOut">
               <a:rPr lang="en-GB" smtClean="0"/>
-              <a:t>17/02/2025</a:t>
+              <a:t>14/03/2025</a:t>
             </a:fld>
             <a:endParaRPr lang="en-GB"/>
           </a:p>
@@ -5403,7 +5403,7 @@
             </a:pPr>
             <a:r>
               <a:rPr lang="nb-NO" sz="1600" dirty="0"/>
-              <a:t>Knucle cylinder</a:t>
+              <a:t>Jib cylinder</a:t>
             </a:r>
           </a:p>
           <a:p>
@@ -5429,7 +5429,7 @@
             </a:pPr>
             <a:r>
               <a:rPr lang="nb-NO" sz="1600" dirty="0"/>
-              <a:t>Knuckle counter balance valve block</a:t>
+              <a:t>Jib counter balance valve block</a:t>
             </a:r>
           </a:p>
           <a:p>
@@ -7647,7 +7647,7 @@
             </a:pPr>
             <a:r>
               <a:rPr lang="nb-NO" sz="1600" dirty="0"/>
-              <a:t>Knucle cylinder</a:t>
+              <a:t>Jib cylinder</a:t>
             </a:r>
           </a:p>
           <a:p>
@@ -7673,7 +7673,7 @@
             </a:pPr>
             <a:r>
               <a:rPr lang="nb-NO" sz="1600" dirty="0"/>
-              <a:t>Knuckle arm</a:t>
+              <a:t>Jib arm</a:t>
             </a:r>
           </a:p>
         </p:txBody>
@@ -7769,7 +7769,7 @@
             </a:pPr>
             <a:r>
               <a:rPr lang="nb-NO" sz="1600" dirty="0"/>
-              <a:t>Pb_K_DCV</a:t>
+              <a:t>Pb_Jib_DCV</a:t>
             </a:r>
           </a:p>
           <a:p>
@@ -7782,7 +7782,7 @@
             </a:pPr>
             <a:r>
               <a:rPr lang="nb-NO" sz="1600" dirty="0"/>
-              <a:t>Pb_K_Cyl</a:t>
+              <a:t>Pb_Jib_Cyl</a:t>
             </a:r>
           </a:p>
           <a:p>
@@ -7795,7 +7795,7 @@
             </a:pPr>
             <a:r>
               <a:rPr lang="nb-NO" sz="1600" dirty="0"/>
-              <a:t>Pa_K_Cyl</a:t>
+              <a:t>Pa_Jib_Cyl</a:t>
             </a:r>
           </a:p>
           <a:p>
@@ -7808,7 +7808,7 @@
             </a:pPr>
             <a:r>
               <a:rPr lang="nb-NO" sz="1600" dirty="0"/>
-              <a:t>Pa_K_DCV</a:t>
+              <a:t>Pa_Jib_DCV</a:t>
             </a:r>
           </a:p>
           <a:p>
@@ -7821,7 +7821,7 @@
             </a:pPr>
             <a:r>
               <a:rPr lang="nb-NO" sz="1600" dirty="0"/>
-              <a:t>Pa_M_DCV</a:t>
+              <a:t>Pa_Main_DCV</a:t>
             </a:r>
           </a:p>
           <a:p>
@@ -7834,7 +7834,7 @@
             </a:pPr>
             <a:r>
               <a:rPr lang="nb-NO" sz="1600" dirty="0"/>
-              <a:t>Pa_M_Cyl</a:t>
+              <a:t>Pa_Main_Cyl</a:t>
             </a:r>
           </a:p>
           <a:p>
@@ -7847,7 +7847,7 @@
             </a:pPr>
             <a:r>
               <a:rPr lang="nb-NO" sz="1600" dirty="0"/>
-              <a:t>Pb_M</a:t>
+              <a:t>Pb_Main</a:t>
             </a:r>
           </a:p>
           <a:p>
@@ -7873,7 +7873,7 @@
             </a:pPr>
             <a:r>
               <a:rPr lang="nb-NO" sz="1600" dirty="0"/>
-              <a:t>Stroke_M_Cyl</a:t>
+              <a:t>Stroke_Main_Cyl</a:t>
             </a:r>
           </a:p>
           <a:p>
@@ -7886,7 +7886,7 @@
             </a:pPr>
             <a:r>
               <a:rPr lang="nb-NO" sz="1600" dirty="0"/>
-              <a:t>Stroke_K_Cyl</a:t>
+              <a:t>Stroke_Jib_Cyl</a:t>
             </a:r>
           </a:p>
         </p:txBody>
@@ -12918,7 +12918,7 @@
             </a:pPr>
             <a:r>
               <a:rPr lang="nb-NO" sz="1600" dirty="0"/>
-              <a:t>Pb_K_DCV</a:t>
+              <a:t>Pb_Jib_DCV</a:t>
             </a:r>
           </a:p>
           <a:p>
@@ -12931,7 +12931,7 @@
             </a:pPr>
             <a:r>
               <a:rPr lang="nb-NO" sz="1600" dirty="0"/>
-              <a:t>Pb_K_Cyl</a:t>
+              <a:t>Pb_Jib_Cyl</a:t>
             </a:r>
           </a:p>
           <a:p>
@@ -12944,7 +12944,7 @@
             </a:pPr>
             <a:r>
               <a:rPr lang="nb-NO" sz="1600" dirty="0"/>
-              <a:t>Pa_K_Cyl</a:t>
+              <a:t>Pa_Jib_Cyl</a:t>
             </a:r>
           </a:p>
           <a:p>
@@ -12957,7 +12957,7 @@
             </a:pPr>
             <a:r>
               <a:rPr lang="nb-NO" sz="1600" dirty="0"/>
-              <a:t>Pa_K_DCV</a:t>
+              <a:t>Pa_Jib_DCV</a:t>
             </a:r>
           </a:p>
           <a:p>
@@ -12970,7 +12970,7 @@
             </a:pPr>
             <a:r>
               <a:rPr lang="nb-NO" sz="1600" dirty="0"/>
-              <a:t>Pa_M_DCV</a:t>
+              <a:t>Pa_Main_DCV</a:t>
             </a:r>
           </a:p>
           <a:p>
@@ -12983,7 +12983,7 @@
             </a:pPr>
             <a:r>
               <a:rPr lang="nb-NO" sz="1600" dirty="0"/>
-              <a:t>Pa_M_Cyl</a:t>
+              <a:t>Pa_Main_Cyl</a:t>
             </a:r>
           </a:p>
           <a:p>
@@ -12996,7 +12996,7 @@
             </a:pPr>
             <a:r>
               <a:rPr lang="nb-NO" sz="1600" dirty="0"/>
-              <a:t>Pb_M</a:t>
+              <a:t>Pb_Main</a:t>
             </a:r>
           </a:p>
           <a:p>
@@ -13022,7 +13022,7 @@
             </a:pPr>
             <a:r>
               <a:rPr lang="nb-NO" sz="1600" dirty="0"/>
-              <a:t>Stroke_M_Cyl</a:t>
+              <a:t>Stroke_Main_Cyl</a:t>
             </a:r>
           </a:p>
           <a:p>
@@ -13035,7 +13035,7 @@
             </a:pPr>
             <a:r>
               <a:rPr lang="nb-NO" sz="1600" dirty="0"/>
-              <a:t>Stroke_K_Cyl</a:t>
+              <a:t>Stroke_Jib_Cyl</a:t>
             </a:r>
           </a:p>
         </p:txBody>

</xml_diff>